<commit_message>
Current working state of the resolution project
</commit_message>
<xml_diff>
--- a/VM_Working/doc/DataProcessingandInstrumentResolutionFunction.pptx
+++ b/VM_Working/doc/DataProcessingandInstrumentResolutionFunction.pptx
@@ -14,8 +14,9 @@
     <p:sldId id="263" r:id="rId8"/>
     <p:sldId id="264" r:id="rId9"/>
     <p:sldId id="265" r:id="rId10"/>
-    <p:sldId id="266" r:id="rId11"/>
-    <p:sldId id="262" r:id="rId12"/>
+    <p:sldId id="267" r:id="rId11"/>
+    <p:sldId id="266" r:id="rId12"/>
+    <p:sldId id="262" r:id="rId13"/>
   </p:sldIdLst>
   <p:sldSz cx="9144000" cy="6858000" type="screen4x3"/>
   <p:notesSz cx="6858000" cy="9144000"/>
@@ -298,7 +299,7 @@
           <a:p>
             <a:fld id="{52514A6A-043F-404F-BFF9-919DF521D229}" type="datetimeFigureOut">
               <a:rPr lang="en-GB" smtClean="0"/>
-              <a:t>20/03/2017</a:t>
+              <a:t>22/03/2017</a:t>
             </a:fld>
             <a:endParaRPr lang="en-GB"/>
           </a:p>
@@ -468,7 +469,7 @@
           <a:p>
             <a:fld id="{52514A6A-043F-404F-BFF9-919DF521D229}" type="datetimeFigureOut">
               <a:rPr lang="en-GB" smtClean="0"/>
-              <a:t>20/03/2017</a:t>
+              <a:t>22/03/2017</a:t>
             </a:fld>
             <a:endParaRPr lang="en-GB"/>
           </a:p>
@@ -648,7 +649,7 @@
           <a:p>
             <a:fld id="{52514A6A-043F-404F-BFF9-919DF521D229}" type="datetimeFigureOut">
               <a:rPr lang="en-GB" smtClean="0"/>
-              <a:t>20/03/2017</a:t>
+              <a:t>22/03/2017</a:t>
             </a:fld>
             <a:endParaRPr lang="en-GB"/>
           </a:p>
@@ -818,7 +819,7 @@
           <a:p>
             <a:fld id="{52514A6A-043F-404F-BFF9-919DF521D229}" type="datetimeFigureOut">
               <a:rPr lang="en-GB" smtClean="0"/>
-              <a:t>20/03/2017</a:t>
+              <a:t>22/03/2017</a:t>
             </a:fld>
             <a:endParaRPr lang="en-GB"/>
           </a:p>
@@ -1064,7 +1065,7 @@
           <a:p>
             <a:fld id="{52514A6A-043F-404F-BFF9-919DF521D229}" type="datetimeFigureOut">
               <a:rPr lang="en-GB" smtClean="0"/>
-              <a:t>20/03/2017</a:t>
+              <a:t>22/03/2017</a:t>
             </a:fld>
             <a:endParaRPr lang="en-GB"/>
           </a:p>
@@ -1352,7 +1353,7 @@
           <a:p>
             <a:fld id="{52514A6A-043F-404F-BFF9-919DF521D229}" type="datetimeFigureOut">
               <a:rPr lang="en-GB" smtClean="0"/>
-              <a:t>20/03/2017</a:t>
+              <a:t>22/03/2017</a:t>
             </a:fld>
             <a:endParaRPr lang="en-GB"/>
           </a:p>
@@ -1774,7 +1775,7 @@
           <a:p>
             <a:fld id="{52514A6A-043F-404F-BFF9-919DF521D229}" type="datetimeFigureOut">
               <a:rPr lang="en-GB" smtClean="0"/>
-              <a:t>20/03/2017</a:t>
+              <a:t>22/03/2017</a:t>
             </a:fld>
             <a:endParaRPr lang="en-GB"/>
           </a:p>
@@ -1892,7 +1893,7 @@
           <a:p>
             <a:fld id="{52514A6A-043F-404F-BFF9-919DF521D229}" type="datetimeFigureOut">
               <a:rPr lang="en-GB" smtClean="0"/>
-              <a:t>20/03/2017</a:t>
+              <a:t>22/03/2017</a:t>
             </a:fld>
             <a:endParaRPr lang="en-GB"/>
           </a:p>
@@ -1987,7 +1988,7 @@
           <a:p>
             <a:fld id="{52514A6A-043F-404F-BFF9-919DF521D229}" type="datetimeFigureOut">
               <a:rPr lang="en-GB" smtClean="0"/>
-              <a:t>20/03/2017</a:t>
+              <a:t>22/03/2017</a:t>
             </a:fld>
             <a:endParaRPr lang="en-GB"/>
           </a:p>
@@ -2264,7 +2265,7 @@
           <a:p>
             <a:fld id="{52514A6A-043F-404F-BFF9-919DF521D229}" type="datetimeFigureOut">
               <a:rPr lang="en-GB" smtClean="0"/>
-              <a:t>20/03/2017</a:t>
+              <a:t>22/03/2017</a:t>
             </a:fld>
             <a:endParaRPr lang="en-GB"/>
           </a:p>
@@ -2517,7 +2518,7 @@
           <a:p>
             <a:fld id="{52514A6A-043F-404F-BFF9-919DF521D229}" type="datetimeFigureOut">
               <a:rPr lang="en-GB" smtClean="0"/>
-              <a:t>20/03/2017</a:t>
+              <a:t>22/03/2017</a:t>
             </a:fld>
             <a:endParaRPr lang="en-GB"/>
           </a:p>
@@ -2730,7 +2731,7 @@
           <a:p>
             <a:fld id="{52514A6A-043F-404F-BFF9-919DF521D229}" type="datetimeFigureOut">
               <a:rPr lang="en-GB" smtClean="0"/>
-              <a:t>20/03/2017</a:t>
+              <a:t>22/03/2017</a:t>
             </a:fld>
             <a:endParaRPr lang="en-GB"/>
           </a:p>
@@ -3161,7 +3162,7 @@
           <a:graphicData uri="http://schemas.openxmlformats.org/presentationml/2006/ole">
             <mc:AlternateContent xmlns:mc="http://schemas.openxmlformats.org/markup-compatibility/2006">
               <mc:Choice xmlns:v="urn:schemas-microsoft-com:vml" Requires="v">
-                <p:oleObj spid="_x0000_s1086" name="Equation" r:id="rId3" imgW="2933640" imgH="279360" progId="Equation.DSMT4">
+                <p:oleObj spid="_x0000_s1090" name="Equation" r:id="rId3" imgW="2933640" imgH="279360" progId="Equation.DSMT4">
                   <p:embed/>
                 </p:oleObj>
               </mc:Choice>
@@ -3441,6 +3442,270 @@
           <a:bodyPr/>
           <a:lstStyle/>
           <a:p>
+            <a:r>
+              <a:rPr lang="en-GB" dirty="0" smtClean="0"/>
+              <a:t>Time velocity distributions</a:t>
+            </a:r>
+            <a:endParaRPr lang="en-GB" dirty="0"/>
+          </a:p>
+        </p:txBody>
+      </p:sp>
+      <p:pic>
+        <p:nvPicPr>
+          <p:cNvPr id="10243" name="Picture 3"/>
+          <p:cNvPicPr>
+            <a:picLocks noChangeArrowheads="1"/>
+          </p:cNvPicPr>
+          <p:nvPr/>
+        </p:nvPicPr>
+        <p:blipFill>
+          <a:blip r:embed="rId2">
+            <a:extLst>
+              <a:ext uri="{28A0092B-C50C-407E-A947-70E740481C1C}">
+                <a14:useLocalDpi xmlns:a14="http://schemas.microsoft.com/office/drawing/2010/main" val="0"/>
+              </a:ext>
+            </a:extLst>
+          </a:blip>
+          <a:srcRect/>
+          <a:stretch>
+            <a:fillRect/>
+          </a:stretch>
+        </p:blipFill>
+        <p:spPr bwMode="auto">
+          <a:xfrm>
+            <a:off x="335144" y="1811004"/>
+            <a:ext cx="3960000" cy="3960000"/>
+          </a:xfrm>
+          <a:prstGeom prst="rect">
+            <a:avLst/>
+          </a:prstGeom>
+          <a:noFill/>
+          <a:ln>
+            <a:noFill/>
+          </a:ln>
+          <a:effectLst/>
+          <a:extLst>
+            <a:ext uri="{909E8E84-426E-40DD-AFC4-6F175D3DCCD1}">
+              <a14:hiddenFill xmlns:a14="http://schemas.microsoft.com/office/drawing/2010/main">
+                <a:solidFill>
+                  <a:schemeClr val="accent1"/>
+                </a:solidFill>
+              </a14:hiddenFill>
+            </a:ext>
+            <a:ext uri="{91240B29-F687-4F45-9708-019B960494DF}">
+              <a14:hiddenLine xmlns:a14="http://schemas.microsoft.com/office/drawing/2010/main" w="9525">
+                <a:solidFill>
+                  <a:schemeClr val="tx1"/>
+                </a:solidFill>
+                <a:miter lim="800000"/>
+                <a:headEnd/>
+                <a:tailEnd/>
+              </a14:hiddenLine>
+            </a:ext>
+            <a:ext uri="{AF507438-7753-43E0-B8FC-AC1667EBCBE1}">
+              <a14:hiddenEffects xmlns:a14="http://schemas.microsoft.com/office/drawing/2010/main">
+                <a:effectLst>
+                  <a:outerShdw dist="35921" dir="2700000" algn="ctr" rotWithShape="0">
+                    <a:schemeClr val="bg2"/>
+                  </a:outerShdw>
+                </a:effectLst>
+              </a14:hiddenEffects>
+            </a:ext>
+          </a:extLst>
+        </p:spPr>
+      </p:pic>
+      <p:pic>
+        <p:nvPicPr>
+          <p:cNvPr id="10244" name="Picture 4"/>
+          <p:cNvPicPr>
+            <a:picLocks noChangeArrowheads="1"/>
+          </p:cNvPicPr>
+          <p:nvPr/>
+        </p:nvPicPr>
+        <p:blipFill>
+          <a:blip r:embed="rId3">
+            <a:extLst>
+              <a:ext uri="{28A0092B-C50C-407E-A947-70E740481C1C}">
+                <a14:useLocalDpi xmlns:a14="http://schemas.microsoft.com/office/drawing/2010/main" val="0"/>
+              </a:ext>
+            </a:extLst>
+          </a:blip>
+          <a:srcRect/>
+          <a:stretch>
+            <a:fillRect/>
+          </a:stretch>
+        </p:blipFill>
+        <p:spPr bwMode="auto">
+          <a:xfrm>
+            <a:off x="4860032" y="1944435"/>
+            <a:ext cx="3960000" cy="3960000"/>
+          </a:xfrm>
+          <a:prstGeom prst="rect">
+            <a:avLst/>
+          </a:prstGeom>
+          <a:noFill/>
+          <a:ln>
+            <a:noFill/>
+          </a:ln>
+          <a:effectLst/>
+          <a:extLst>
+            <a:ext uri="{909E8E84-426E-40DD-AFC4-6F175D3DCCD1}">
+              <a14:hiddenFill xmlns:a14="http://schemas.microsoft.com/office/drawing/2010/main">
+                <a:solidFill>
+                  <a:schemeClr val="accent1"/>
+                </a:solidFill>
+              </a14:hiddenFill>
+            </a:ext>
+            <a:ext uri="{91240B29-F687-4F45-9708-019B960494DF}">
+              <a14:hiddenLine xmlns:a14="http://schemas.microsoft.com/office/drawing/2010/main" w="9525">
+                <a:solidFill>
+                  <a:schemeClr val="tx1"/>
+                </a:solidFill>
+                <a:miter lim="800000"/>
+                <a:headEnd/>
+                <a:tailEnd/>
+              </a14:hiddenLine>
+            </a:ext>
+            <a:ext uri="{AF507438-7753-43E0-B8FC-AC1667EBCBE1}">
+              <a14:hiddenEffects xmlns:a14="http://schemas.microsoft.com/office/drawing/2010/main">
+                <a:effectLst>
+                  <a:outerShdw dist="35921" dir="2700000" algn="ctr" rotWithShape="0">
+                    <a:schemeClr val="bg2"/>
+                  </a:outerShdw>
+                </a:effectLst>
+              </a14:hiddenEffects>
+            </a:ext>
+          </a:extLst>
+        </p:spPr>
+      </p:pic>
+      <p:sp>
+        <p:nvSpPr>
+          <p:cNvPr id="4" name="TextBox 3"/>
+          <p:cNvSpPr txBox="1"/>
+          <p:nvPr/>
+        </p:nvSpPr>
+        <p:spPr>
+          <a:xfrm>
+            <a:off x="683568" y="1473288"/>
+            <a:ext cx="3475310" cy="369332"/>
+          </a:xfrm>
+          <a:prstGeom prst="rect">
+            <a:avLst/>
+          </a:prstGeom>
+          <a:noFill/>
+        </p:spPr>
+        <p:txBody>
+          <a:bodyPr wrap="none" rtlCol="0">
+            <a:spAutoFit/>
+          </a:bodyPr>
+          <a:lstStyle/>
+          <a:p>
+            <a:r>
+              <a:rPr lang="en-GB" dirty="0" smtClean="0"/>
+              <a:t>Moderator profile rep 1 at chopper</a:t>
+            </a:r>
+            <a:endParaRPr lang="en-GB" dirty="0"/>
+          </a:p>
+        </p:txBody>
+      </p:sp>
+      <p:sp>
+        <p:nvSpPr>
+          <p:cNvPr id="8" name="TextBox 7"/>
+          <p:cNvSpPr txBox="1"/>
+          <p:nvPr/>
+        </p:nvSpPr>
+        <p:spPr>
+          <a:xfrm>
+            <a:off x="5080867" y="1268760"/>
+            <a:ext cx="3043077" cy="646331"/>
+          </a:xfrm>
+          <a:prstGeom prst="rect">
+            <a:avLst/>
+          </a:prstGeom>
+          <a:noFill/>
+        </p:spPr>
+        <p:txBody>
+          <a:bodyPr wrap="none" rtlCol="0">
+            <a:spAutoFit/>
+          </a:bodyPr>
+          <a:lstStyle/>
+          <a:p>
+            <a:r>
+              <a:rPr lang="en-GB" dirty="0" smtClean="0"/>
+              <a:t>Neutron’s time-velocity profile</a:t>
+            </a:r>
+          </a:p>
+          <a:p>
+            <a:pPr algn="ctr"/>
+            <a:r>
+              <a:rPr lang="en-GB" dirty="0"/>
+              <a:t>rep 1 </a:t>
+            </a:r>
+            <a:r>
+              <a:rPr lang="en-GB" dirty="0" smtClean="0"/>
+              <a:t>at sample</a:t>
+            </a:r>
+            <a:endParaRPr lang="en-GB" dirty="0"/>
+          </a:p>
+        </p:txBody>
+      </p:sp>
+    </p:spTree>
+    <p:extLst>
+      <p:ext uri="{BB962C8B-B14F-4D97-AF65-F5344CB8AC3E}">
+        <p14:creationId xmlns:p14="http://schemas.microsoft.com/office/powerpoint/2010/main" val="292417705"/>
+      </p:ext>
+    </p:extLst>
+  </p:cSld>
+  <p:clrMapOvr>
+    <a:masterClrMapping/>
+  </p:clrMapOvr>
+</p:sld>
+</file>
+
+<file path=ppt/slides/slide11.xml><?xml version="1.0" encoding="utf-8"?>
+<p:sld xmlns:a="http://schemas.openxmlformats.org/drawingml/2006/main" xmlns:r="http://schemas.openxmlformats.org/officeDocument/2006/relationships" xmlns:p="http://schemas.openxmlformats.org/presentationml/2006/main">
+  <p:cSld>
+    <p:spTree>
+      <p:nvGrpSpPr>
+        <p:cNvPr id="1" name=""/>
+        <p:cNvGrpSpPr/>
+        <p:nvPr/>
+      </p:nvGrpSpPr>
+      <p:grpSpPr>
+        <a:xfrm>
+          <a:off x="0" y="0"/>
+          <a:ext cx="0" cy="0"/>
+          <a:chOff x="0" y="0"/>
+          <a:chExt cx="0" cy="0"/>
+        </a:xfrm>
+      </p:grpSpPr>
+      <p:sp>
+        <p:nvSpPr>
+          <p:cNvPr id="2" name="Title 1"/>
+          <p:cNvSpPr>
+            <a:spLocks noGrp="1"/>
+          </p:cNvSpPr>
+          <p:nvPr>
+            <p:ph type="title"/>
+          </p:nvPr>
+        </p:nvSpPr>
+        <p:spPr/>
+        <p:txBody>
+          <a:bodyPr/>
+          <a:lstStyle/>
+          <a:p>
+            <a:r>
+              <a:rPr lang="en-GB" smtClean="0"/>
+              <a:t>Familiar solution only </a:t>
+            </a:r>
+            <a:r>
+              <a:rPr lang="en-GB" dirty="0" smtClean="0"/>
+              <a:t>if</a:t>
+            </a:r>
+            <a:r>
+              <a:rPr lang="en-GB" dirty="0" smtClean="0"/>
+              <a:t>:</a:t>
+            </a:r>
             <a:endParaRPr lang="en-GB" dirty="0"/>
           </a:p>
         </p:txBody>
@@ -3493,7 +3758,7 @@
           <a:graphicData uri="http://schemas.openxmlformats.org/presentationml/2006/ole">
             <mc:AlternateContent xmlns:mc="http://schemas.openxmlformats.org/markup-compatibility/2006">
               <mc:Choice xmlns:v="urn:schemas-microsoft-com:vml" Requires="v">
-                <p:oleObj spid="_x0000_s9220" name="Equation" r:id="rId3" imgW="2387520" imgH="939600" progId="Equation.DSMT4">
+                <p:oleObj spid="_x0000_s9225" name="Equation" r:id="rId3" imgW="2387520" imgH="939600" progId="Equation.DSMT4">
                   <p:embed/>
                 </p:oleObj>
               </mc:Choice>
@@ -3567,7 +3832,7 @@
 </p:sld>
 </file>
 
-<file path=ppt/slides/slide11.xml><?xml version="1.0" encoding="utf-8"?>
+<file path=ppt/slides/slide12.xml><?xml version="1.0" encoding="utf-8"?>
 <p:sld xmlns:a="http://schemas.openxmlformats.org/drawingml/2006/main" xmlns:r="http://schemas.openxmlformats.org/officeDocument/2006/relationships" xmlns:p="http://schemas.openxmlformats.org/presentationml/2006/main">
   <p:cSld>
     <p:spTree>
@@ -3637,7 +3902,7 @@
           <a:graphicData uri="http://schemas.openxmlformats.org/presentationml/2006/ole">
             <mc:AlternateContent xmlns:mc="http://schemas.openxmlformats.org/markup-compatibility/2006">
               <mc:Choice xmlns:v="urn:schemas-microsoft-com:vml" Requires="v">
-                <p:oleObj spid="_x0000_s7207" name="Equation" r:id="rId3" imgW="2565360" imgH="469800" progId="Equation.DSMT4">
+                <p:oleObj spid="_x0000_s7211" name="Equation" r:id="rId3" imgW="2565360" imgH="469800" progId="Equation.DSMT4">
                   <p:embed/>
                 </p:oleObj>
               </mc:Choice>
@@ -4299,7 +4564,7 @@
           <a:graphicData uri="http://schemas.openxmlformats.org/presentationml/2006/ole">
             <mc:AlternateContent xmlns:mc="http://schemas.openxmlformats.org/markup-compatibility/2006">
               <mc:Choice xmlns:v="urn:schemas-microsoft-com:vml" Requires="v">
-                <p:oleObj spid="_x0000_s2540" name="Equation" r:id="rId6" imgW="342720" imgH="203040" progId="Equation.DSMT4">
+                <p:oleObj spid="_x0000_s2576" name="Equation" r:id="rId6" imgW="342720" imgH="203040" progId="Equation.DSMT4">
                   <p:embed/>
                 </p:oleObj>
               </mc:Choice>
@@ -4356,7 +4621,7 @@
           <a:graphicData uri="http://schemas.openxmlformats.org/presentationml/2006/ole">
             <mc:AlternateContent xmlns:mc="http://schemas.openxmlformats.org/markup-compatibility/2006">
               <mc:Choice xmlns:v="urn:schemas-microsoft-com:vml" Requires="v">
-                <p:oleObj spid="_x0000_s2541" name="Equation" r:id="rId8" imgW="330120" imgH="203040" progId="Equation.DSMT4">
+                <p:oleObj spid="_x0000_s2577" name="Equation" r:id="rId8" imgW="330120" imgH="203040" progId="Equation.DSMT4">
                   <p:embed/>
                 </p:oleObj>
               </mc:Choice>
@@ -4427,7 +4692,7 @@
             <a:graphicData uri="http://schemas.openxmlformats.org/presentationml/2006/ole">
               <mc:AlternateContent xmlns:mc="http://schemas.openxmlformats.org/markup-compatibility/2006">
                 <mc:Choice xmlns:v="urn:schemas-microsoft-com:vml" Requires="v">
-                  <p:oleObj spid="_x0000_s2542" name="Equation" r:id="rId10" imgW="4140000" imgH="457200" progId="Equation.DSMT4">
+                  <p:oleObj spid="_x0000_s2578" name="Equation" r:id="rId10" imgW="4140000" imgH="457200" progId="Equation.DSMT4">
                     <p:embed/>
                   </p:oleObj>
                 </mc:Choice>
@@ -4585,7 +4850,7 @@
           <a:graphicData uri="http://schemas.openxmlformats.org/presentationml/2006/ole">
             <mc:AlternateContent xmlns:mc="http://schemas.openxmlformats.org/markup-compatibility/2006">
               <mc:Choice xmlns:v="urn:schemas-microsoft-com:vml" Requires="v">
-                <p:oleObj spid="_x0000_s2543" name="Equation" r:id="rId13" imgW="355320" imgH="253800" progId="Equation.DSMT4">
+                <p:oleObj spid="_x0000_s2579" name="Equation" r:id="rId13" imgW="355320" imgH="253800" progId="Equation.DSMT4">
                   <p:embed/>
                 </p:oleObj>
               </mc:Choice>
@@ -4642,7 +4907,7 @@
           <a:graphicData uri="http://schemas.openxmlformats.org/presentationml/2006/ole">
             <mc:AlternateContent xmlns:mc="http://schemas.openxmlformats.org/markup-compatibility/2006">
               <mc:Choice xmlns:v="urn:schemas-microsoft-com:vml" Requires="v">
-                <p:oleObj spid="_x0000_s2544" name="Equation" r:id="rId15" imgW="380880" imgH="253800" progId="Equation.DSMT4">
+                <p:oleObj spid="_x0000_s2580" name="Equation" r:id="rId15" imgW="380880" imgH="253800" progId="Equation.DSMT4">
                   <p:embed/>
                 </p:oleObj>
               </mc:Choice>
@@ -4699,7 +4964,7 @@
           <a:graphicData uri="http://schemas.openxmlformats.org/presentationml/2006/ole">
             <mc:AlternateContent xmlns:mc="http://schemas.openxmlformats.org/markup-compatibility/2006">
               <mc:Choice xmlns:v="urn:schemas-microsoft-com:vml" Requires="v">
-                <p:oleObj spid="_x0000_s2545" name="Equation" r:id="rId17" imgW="368280" imgH="253800" progId="Equation.DSMT4">
+                <p:oleObj spid="_x0000_s2581" name="Equation" r:id="rId17" imgW="368280" imgH="253800" progId="Equation.DSMT4">
                   <p:embed/>
                 </p:oleObj>
               </mc:Choice>
@@ -4756,7 +5021,7 @@
           <a:graphicData uri="http://schemas.openxmlformats.org/presentationml/2006/ole">
             <mc:AlternateContent xmlns:mc="http://schemas.openxmlformats.org/markup-compatibility/2006">
               <mc:Choice xmlns:v="urn:schemas-microsoft-com:vml" Requires="v">
-                <p:oleObj spid="_x0000_s2546" name="Equation" r:id="rId19" imgW="317160" imgH="203040" progId="Equation.DSMT4">
+                <p:oleObj spid="_x0000_s2582" name="Equation" r:id="rId19" imgW="317160" imgH="203040" progId="Equation.DSMT4">
                   <p:embed/>
                 </p:oleObj>
               </mc:Choice>
@@ -4813,7 +5078,7 @@
           <a:graphicData uri="http://schemas.openxmlformats.org/presentationml/2006/ole">
             <mc:AlternateContent xmlns:mc="http://schemas.openxmlformats.org/markup-compatibility/2006">
               <mc:Choice xmlns:v="urn:schemas-microsoft-com:vml" Requires="v">
-                <p:oleObj spid="_x0000_s2547" name="Equation" r:id="rId21" imgW="304560" imgH="203040" progId="Equation.DSMT4">
+                <p:oleObj spid="_x0000_s2583" name="Equation" r:id="rId21" imgW="304560" imgH="203040" progId="Equation.DSMT4">
                   <p:embed/>
                 </p:oleObj>
               </mc:Choice>
@@ -5314,7 +5579,7 @@
           <a:graphicData uri="http://schemas.openxmlformats.org/presentationml/2006/ole">
             <mc:AlternateContent xmlns:mc="http://schemas.openxmlformats.org/markup-compatibility/2006">
               <mc:Choice xmlns:v="urn:schemas-microsoft-com:vml" Requires="v">
-                <p:oleObj spid="_x0000_s2548" name="Equation" r:id="rId23" imgW="330120" imgH="203040" progId="Equation.DSMT4">
+                <p:oleObj spid="_x0000_s2584" name="Equation" r:id="rId23" imgW="330120" imgH="203040" progId="Equation.DSMT4">
                   <p:embed/>
                 </p:oleObj>
               </mc:Choice>
@@ -5866,7 +6131,7 @@
           <a:graphicData uri="http://schemas.openxmlformats.org/presentationml/2006/ole">
             <mc:AlternateContent xmlns:mc="http://schemas.openxmlformats.org/markup-compatibility/2006">
               <mc:Choice xmlns:v="urn:schemas-microsoft-com:vml" Requires="v">
-                <p:oleObj spid="_x0000_s4139" name="Equation" r:id="rId5" imgW="2222280" imgH="469800" progId="Equation.DSMT4">
+                <p:oleObj spid="_x0000_s4143" name="Equation" r:id="rId5" imgW="2222280" imgH="469800" progId="Equation.DSMT4">
                   <p:embed/>
                 </p:oleObj>
               </mc:Choice>
@@ -6344,7 +6609,7 @@
           <a:graphicData uri="http://schemas.openxmlformats.org/presentationml/2006/ole">
             <mc:AlternateContent xmlns:mc="http://schemas.openxmlformats.org/markup-compatibility/2006">
               <mc:Choice xmlns:v="urn:schemas-microsoft-com:vml" Requires="v">
-                <p:oleObj spid="_x0000_s5410" name="Equation" r:id="rId7" imgW="3682800" imgH="457200" progId="Equation.DSMT4">
+                <p:oleObj spid="_x0000_s5442" name="Equation" r:id="rId7" imgW="3682800" imgH="457200" progId="Equation.DSMT4">
                   <p:embed/>
                 </p:oleObj>
               </mc:Choice>
@@ -6401,7 +6666,7 @@
           <a:graphicData uri="http://schemas.openxmlformats.org/presentationml/2006/ole">
             <mc:AlternateContent xmlns:mc="http://schemas.openxmlformats.org/markup-compatibility/2006">
               <mc:Choice xmlns:v="urn:schemas-microsoft-com:vml" Requires="v">
-                <p:oleObj spid="_x0000_s5411" name="Equation" r:id="rId9" imgW="342720" imgH="203040" progId="Equation.DSMT4">
+                <p:oleObj spid="_x0000_s5443" name="Equation" r:id="rId9" imgW="342720" imgH="203040" progId="Equation.DSMT4">
                   <p:embed/>
                 </p:oleObj>
               </mc:Choice>
@@ -6484,7 +6749,7 @@
           <a:graphicData uri="http://schemas.openxmlformats.org/presentationml/2006/ole">
             <mc:AlternateContent xmlns:mc="http://schemas.openxmlformats.org/markup-compatibility/2006">
               <mc:Choice xmlns:v="urn:schemas-microsoft-com:vml" Requires="v">
-                <p:oleObj spid="_x0000_s5412" name="Equation" r:id="rId11" imgW="330120" imgH="203040" progId="Equation.DSMT4">
+                <p:oleObj spid="_x0000_s5444" name="Equation" r:id="rId11" imgW="330120" imgH="203040" progId="Equation.DSMT4">
                   <p:embed/>
                 </p:oleObj>
               </mc:Choice>
@@ -6573,7 +6838,7 @@
           <a:graphicData uri="http://schemas.openxmlformats.org/presentationml/2006/ole">
             <mc:AlternateContent xmlns:mc="http://schemas.openxmlformats.org/markup-compatibility/2006">
               <mc:Choice xmlns:v="urn:schemas-microsoft-com:vml" Requires="v">
-                <p:oleObj spid="_x0000_s5413" name="Equation" r:id="rId13" imgW="330120" imgH="203040" progId="Equation.DSMT4">
+                <p:oleObj spid="_x0000_s5445" name="Equation" r:id="rId13" imgW="330120" imgH="203040" progId="Equation.DSMT4">
                   <p:embed/>
                 </p:oleObj>
               </mc:Choice>
@@ -6662,7 +6927,7 @@
           <a:graphicData uri="http://schemas.openxmlformats.org/presentationml/2006/ole">
             <mc:AlternateContent xmlns:mc="http://schemas.openxmlformats.org/markup-compatibility/2006">
               <mc:Choice xmlns:v="urn:schemas-microsoft-com:vml" Requires="v">
-                <p:oleObj spid="_x0000_s5414" name="Equation" r:id="rId15" imgW="380880" imgH="253800" progId="Equation.DSMT4">
+                <p:oleObj spid="_x0000_s5446" name="Equation" r:id="rId15" imgW="380880" imgH="253800" progId="Equation.DSMT4">
                   <p:embed/>
                 </p:oleObj>
               </mc:Choice>
@@ -6732,7 +6997,7 @@
           <a:graphicData uri="http://schemas.openxmlformats.org/presentationml/2006/ole">
             <mc:AlternateContent xmlns:mc="http://schemas.openxmlformats.org/markup-compatibility/2006">
               <mc:Choice xmlns:v="urn:schemas-microsoft-com:vml" Requires="v">
-                <p:oleObj spid="_x0000_s5415" name="Equation" r:id="rId17" imgW="368280" imgH="253800" progId="Equation.DSMT4">
+                <p:oleObj spid="_x0000_s5447" name="Equation" r:id="rId17" imgW="368280" imgH="253800" progId="Equation.DSMT4">
                   <p:embed/>
                 </p:oleObj>
               </mc:Choice>
@@ -6821,7 +7086,7 @@
           <a:graphicData uri="http://schemas.openxmlformats.org/presentationml/2006/ole">
             <mc:AlternateContent xmlns:mc="http://schemas.openxmlformats.org/markup-compatibility/2006">
               <mc:Choice xmlns:v="urn:schemas-microsoft-com:vml" Requires="v">
-                <p:oleObj spid="_x0000_s5416" name="Equation" r:id="rId19" imgW="355320" imgH="253800" progId="Equation.DSMT4">
+                <p:oleObj spid="_x0000_s5448" name="Equation" r:id="rId19" imgW="355320" imgH="253800" progId="Equation.DSMT4">
                   <p:embed/>
                 </p:oleObj>
               </mc:Choice>
@@ -7113,7 +7378,7 @@
           <a:graphicData uri="http://schemas.openxmlformats.org/presentationml/2006/ole">
             <mc:AlternateContent xmlns:mc="http://schemas.openxmlformats.org/markup-compatibility/2006">
               <mc:Choice xmlns:v="urn:schemas-microsoft-com:vml" Requires="v">
-                <p:oleObj spid="_x0000_s5417" name="Equation" r:id="rId21" imgW="330120" imgH="203040" progId="Equation.DSMT4">
+                <p:oleObj spid="_x0000_s5449" name="Equation" r:id="rId21" imgW="330120" imgH="203040" progId="Equation.DSMT4">
                   <p:embed/>
                 </p:oleObj>
               </mc:Choice>
@@ -7281,7 +7546,7 @@
           <a:graphicData uri="http://schemas.openxmlformats.org/presentationml/2006/ole">
             <mc:AlternateContent xmlns:mc="http://schemas.openxmlformats.org/markup-compatibility/2006">
               <mc:Choice xmlns:v="urn:schemas-microsoft-com:vml" Requires="v">
-                <p:oleObj spid="_x0000_s6409" name="Equation" r:id="rId3" imgW="1765080" imgH="469800" progId="Equation.DSMT4">
+                <p:oleObj spid="_x0000_s6441" name="Equation" r:id="rId3" imgW="1765080" imgH="469800" progId="Equation.DSMT4">
                   <p:embed/>
                 </p:oleObj>
               </mc:Choice>
@@ -7561,7 +7826,7 @@
           <a:graphicData uri="http://schemas.openxmlformats.org/presentationml/2006/ole">
             <mc:AlternateContent xmlns:mc="http://schemas.openxmlformats.org/markup-compatibility/2006">
               <mc:Choice xmlns:v="urn:schemas-microsoft-com:vml" Requires="v">
-                <p:oleObj spid="_x0000_s6410" name="Equation" r:id="rId9" imgW="330120" imgH="203040" progId="Equation.DSMT4">
+                <p:oleObj spid="_x0000_s6442" name="Equation" r:id="rId9" imgW="330120" imgH="203040" progId="Equation.DSMT4">
                   <p:embed/>
                 </p:oleObj>
               </mc:Choice>
@@ -7644,7 +7909,7 @@
           <a:graphicData uri="http://schemas.openxmlformats.org/presentationml/2006/ole">
             <mc:AlternateContent xmlns:mc="http://schemas.openxmlformats.org/markup-compatibility/2006">
               <mc:Choice xmlns:v="urn:schemas-microsoft-com:vml" Requires="v">
-                <p:oleObj spid="_x0000_s6411" name="Equation" r:id="rId11" imgW="330057" imgH="203112" progId="Equation.DSMT4">
+                <p:oleObj spid="_x0000_s6443" name="Equation" r:id="rId11" imgW="330057" imgH="203112" progId="Equation.DSMT4">
                   <p:embed/>
                 </p:oleObj>
               </mc:Choice>
@@ -7733,7 +7998,7 @@
           <a:graphicData uri="http://schemas.openxmlformats.org/presentationml/2006/ole">
             <mc:AlternateContent xmlns:mc="http://schemas.openxmlformats.org/markup-compatibility/2006">
               <mc:Choice xmlns:v="urn:schemas-microsoft-com:vml" Requires="v">
-                <p:oleObj spid="_x0000_s6412" name="Equation" r:id="rId13" imgW="241200" imgH="203040" progId="Equation.DSMT4">
+                <p:oleObj spid="_x0000_s6444" name="Equation" r:id="rId13" imgW="241200" imgH="203040" progId="Equation.DSMT4">
                   <p:embed/>
                 </p:oleObj>
               </mc:Choice>
@@ -7816,7 +8081,7 @@
           <a:graphicData uri="http://schemas.openxmlformats.org/presentationml/2006/ole">
             <mc:AlternateContent xmlns:mc="http://schemas.openxmlformats.org/markup-compatibility/2006">
               <mc:Choice xmlns:v="urn:schemas-microsoft-com:vml" Requires="v">
-                <p:oleObj spid="_x0000_s6413" name="Equation" r:id="rId15" imgW="368140" imgH="253890" progId="Equation.DSMT4">
+                <p:oleObj spid="_x0000_s6445" name="Equation" r:id="rId15" imgW="368140" imgH="253890" progId="Equation.DSMT4">
                   <p:embed/>
                 </p:oleObj>
               </mc:Choice>
@@ -7905,7 +8170,7 @@
           <a:graphicData uri="http://schemas.openxmlformats.org/presentationml/2006/ole">
             <mc:AlternateContent xmlns:mc="http://schemas.openxmlformats.org/markup-compatibility/2006">
               <mc:Choice xmlns:v="urn:schemas-microsoft-com:vml" Requires="v">
-                <p:oleObj spid="_x0000_s6414" name="Equation" r:id="rId17" imgW="380835" imgH="253890" progId="Equation.DSMT4">
+                <p:oleObj spid="_x0000_s6446" name="Equation" r:id="rId17" imgW="380835" imgH="253890" progId="Equation.DSMT4">
                   <p:embed/>
                 </p:oleObj>
               </mc:Choice>
@@ -8062,7 +8327,7 @@
           <a:graphicData uri="http://schemas.openxmlformats.org/presentationml/2006/ole">
             <mc:AlternateContent xmlns:mc="http://schemas.openxmlformats.org/markup-compatibility/2006">
               <mc:Choice xmlns:v="urn:schemas-microsoft-com:vml" Requires="v">
-                <p:oleObj spid="_x0000_s6415" name="Equation" r:id="rId19" imgW="241200" imgH="203040" progId="Equation.DSMT4">
+                <p:oleObj spid="_x0000_s6447" name="Equation" r:id="rId19" imgW="241200" imgH="203040" progId="Equation.DSMT4">
                   <p:embed/>
                 </p:oleObj>
               </mc:Choice>
@@ -8145,7 +8410,7 @@
           <a:graphicData uri="http://schemas.openxmlformats.org/presentationml/2006/ole">
             <mc:AlternateContent xmlns:mc="http://schemas.openxmlformats.org/markup-compatibility/2006">
               <mc:Choice xmlns:v="urn:schemas-microsoft-com:vml" Requires="v">
-                <p:oleObj spid="_x0000_s6416" name="Equation" r:id="rId20" imgW="330057" imgH="203112" progId="Equation.DSMT4">
+                <p:oleObj spid="_x0000_s6448" name="Equation" r:id="rId20" imgW="330057" imgH="203112" progId="Equation.DSMT4">
                   <p:embed/>
                 </p:oleObj>
               </mc:Choice>
@@ -10253,7 +10518,6 @@
                 <a:rPr lang="en-GB" dirty="0"/>
                 <a:t>2</a:t>
               </a:r>
-              <a:endParaRPr lang="en-GB" dirty="0"/>
             </a:p>
           </p:txBody>
         </p:sp>

</xml_diff>

<commit_message>
notionally working 2D modrator model deconvolution
</commit_message>
<xml_diff>
--- a/VM_Working/doc/DataProcessingandInstrumentResolutionFunction.pptx
+++ b/VM_Working/doc/DataProcessingandInstrumentResolutionFunction.pptx
@@ -299,7 +299,7 @@
           <a:p>
             <a:fld id="{52514A6A-043F-404F-BFF9-919DF521D229}" type="datetimeFigureOut">
               <a:rPr lang="en-GB" smtClean="0"/>
-              <a:t>22/03/2017</a:t>
+              <a:t>16/11/2017</a:t>
             </a:fld>
             <a:endParaRPr lang="en-GB"/>
           </a:p>
@@ -469,7 +469,7 @@
           <a:p>
             <a:fld id="{52514A6A-043F-404F-BFF9-919DF521D229}" type="datetimeFigureOut">
               <a:rPr lang="en-GB" smtClean="0"/>
-              <a:t>22/03/2017</a:t>
+              <a:t>16/11/2017</a:t>
             </a:fld>
             <a:endParaRPr lang="en-GB"/>
           </a:p>
@@ -649,7 +649,7 @@
           <a:p>
             <a:fld id="{52514A6A-043F-404F-BFF9-919DF521D229}" type="datetimeFigureOut">
               <a:rPr lang="en-GB" smtClean="0"/>
-              <a:t>22/03/2017</a:t>
+              <a:t>16/11/2017</a:t>
             </a:fld>
             <a:endParaRPr lang="en-GB"/>
           </a:p>
@@ -819,7 +819,7 @@
           <a:p>
             <a:fld id="{52514A6A-043F-404F-BFF9-919DF521D229}" type="datetimeFigureOut">
               <a:rPr lang="en-GB" smtClean="0"/>
-              <a:t>22/03/2017</a:t>
+              <a:t>16/11/2017</a:t>
             </a:fld>
             <a:endParaRPr lang="en-GB"/>
           </a:p>
@@ -1065,7 +1065,7 @@
           <a:p>
             <a:fld id="{52514A6A-043F-404F-BFF9-919DF521D229}" type="datetimeFigureOut">
               <a:rPr lang="en-GB" smtClean="0"/>
-              <a:t>22/03/2017</a:t>
+              <a:t>16/11/2017</a:t>
             </a:fld>
             <a:endParaRPr lang="en-GB"/>
           </a:p>
@@ -1353,7 +1353,7 @@
           <a:p>
             <a:fld id="{52514A6A-043F-404F-BFF9-919DF521D229}" type="datetimeFigureOut">
               <a:rPr lang="en-GB" smtClean="0"/>
-              <a:t>22/03/2017</a:t>
+              <a:t>16/11/2017</a:t>
             </a:fld>
             <a:endParaRPr lang="en-GB"/>
           </a:p>
@@ -1775,7 +1775,7 @@
           <a:p>
             <a:fld id="{52514A6A-043F-404F-BFF9-919DF521D229}" type="datetimeFigureOut">
               <a:rPr lang="en-GB" smtClean="0"/>
-              <a:t>22/03/2017</a:t>
+              <a:t>16/11/2017</a:t>
             </a:fld>
             <a:endParaRPr lang="en-GB"/>
           </a:p>
@@ -1893,7 +1893,7 @@
           <a:p>
             <a:fld id="{52514A6A-043F-404F-BFF9-919DF521D229}" type="datetimeFigureOut">
               <a:rPr lang="en-GB" smtClean="0"/>
-              <a:t>22/03/2017</a:t>
+              <a:t>16/11/2017</a:t>
             </a:fld>
             <a:endParaRPr lang="en-GB"/>
           </a:p>
@@ -1988,7 +1988,7 @@
           <a:p>
             <a:fld id="{52514A6A-043F-404F-BFF9-919DF521D229}" type="datetimeFigureOut">
               <a:rPr lang="en-GB" smtClean="0"/>
-              <a:t>22/03/2017</a:t>
+              <a:t>16/11/2017</a:t>
             </a:fld>
             <a:endParaRPr lang="en-GB"/>
           </a:p>
@@ -2265,7 +2265,7 @@
           <a:p>
             <a:fld id="{52514A6A-043F-404F-BFF9-919DF521D229}" type="datetimeFigureOut">
               <a:rPr lang="en-GB" smtClean="0"/>
-              <a:t>22/03/2017</a:t>
+              <a:t>16/11/2017</a:t>
             </a:fld>
             <a:endParaRPr lang="en-GB"/>
           </a:p>
@@ -2518,7 +2518,7 @@
           <a:p>
             <a:fld id="{52514A6A-043F-404F-BFF9-919DF521D229}" type="datetimeFigureOut">
               <a:rPr lang="en-GB" smtClean="0"/>
-              <a:t>22/03/2017</a:t>
+              <a:t>16/11/2017</a:t>
             </a:fld>
             <a:endParaRPr lang="en-GB"/>
           </a:p>
@@ -2731,7 +2731,7 @@
           <a:p>
             <a:fld id="{52514A6A-043F-404F-BFF9-919DF521D229}" type="datetimeFigureOut">
               <a:rPr lang="en-GB" smtClean="0"/>
-              <a:t>22/03/2017</a:t>
+              <a:t>16/11/2017</a:t>
             </a:fld>
             <a:endParaRPr lang="en-GB"/>
           </a:p>
@@ -3162,7 +3162,7 @@
           <a:graphicData uri="http://schemas.openxmlformats.org/presentationml/2006/ole">
             <mc:AlternateContent xmlns:mc="http://schemas.openxmlformats.org/markup-compatibility/2006">
               <mc:Choice xmlns:v="urn:schemas-microsoft-com:vml" Requires="v">
-                <p:oleObj spid="_x0000_s1090" name="Equation" r:id="rId3" imgW="2933640" imgH="279360" progId="Equation.DSMT4">
+                <p:oleObj spid="_x0000_s1097" name="Equation" r:id="rId3" imgW="2933640" imgH="279360" progId="Equation.DSMT4">
                   <p:embed/>
                 </p:oleObj>
               </mc:Choice>
@@ -3689,22 +3689,19 @@
             <p:ph type="title"/>
           </p:nvPr>
         </p:nvSpPr>
-        <p:spPr/>
+        <p:spPr>
+          <a:xfrm>
+            <a:off x="457200" y="274638"/>
+            <a:ext cx="8229600" cy="922114"/>
+          </a:xfrm>
+        </p:spPr>
         <p:txBody>
           <a:bodyPr/>
           <a:lstStyle/>
           <a:p>
             <a:r>
-              <a:rPr lang="en-GB" smtClean="0"/>
-              <a:t>Familiar solution only </a:t>
-            </a:r>
-            <a:r>
               <a:rPr lang="en-GB" dirty="0" smtClean="0"/>
-              <a:t>if</a:t>
-            </a:r>
-            <a:r>
-              <a:rPr lang="en-GB" dirty="0" smtClean="0"/>
-              <a:t>:</a:t>
+              <a:t>2D time-velocity profile:</a:t>
             </a:r>
             <a:endParaRPr lang="en-GB" dirty="0"/>
           </a:p>
@@ -3720,7 +3717,12 @@
             <p:ph idx="1"/>
           </p:nvPr>
         </p:nvSpPr>
-        <p:spPr/>
+        <p:spPr>
+          <a:xfrm>
+            <a:off x="457200" y="3140968"/>
+            <a:ext cx="8229600" cy="2985195"/>
+          </a:xfrm>
+        </p:spPr>
         <p:txBody>
           <a:bodyPr/>
           <a:lstStyle/>
@@ -3745,25 +3747,25 @@
           <p:nvPr>
             <p:extLst>
               <p:ext uri="{D42A27DB-BD31-4B8C-83A1-F6EECF244321}">
-                <p14:modId xmlns:p14="http://schemas.microsoft.com/office/powerpoint/2010/main" val="2987216858"/>
+                <p14:modId xmlns:p14="http://schemas.microsoft.com/office/powerpoint/2010/main" val="3119557395"/>
               </p:ext>
             </p:extLst>
           </p:nvPr>
         </p:nvGraphicFramePr>
         <p:xfrm>
-          <a:off x="1043608" y="1916832"/>
-          <a:ext cx="5689600" cy="2686050"/>
+          <a:off x="539552" y="4221088"/>
+          <a:ext cx="8020590" cy="1159504"/>
         </p:xfrm>
         <a:graphic>
           <a:graphicData uri="http://schemas.openxmlformats.org/presentationml/2006/ole">
             <mc:AlternateContent xmlns:mc="http://schemas.openxmlformats.org/markup-compatibility/2006">
               <mc:Choice xmlns:v="urn:schemas-microsoft-com:vml" Requires="v">
-                <p:oleObj spid="_x0000_s9225" name="Equation" r:id="rId3" imgW="2387520" imgH="939600" progId="Equation.DSMT4">
+                <p:oleObj spid="_x0000_s9256" name="Equation" r:id="rId3" imgW="3898800" imgH="469800" progId="Equation.DSMT4">
                   <p:embed/>
                 </p:oleObj>
               </mc:Choice>
               <mc:Fallback>
-                <p:oleObj name="Equation" r:id="rId3" imgW="2387520" imgH="939600" progId="Equation.DSMT4">
+                <p:oleObj name="Equation" r:id="rId3" imgW="3898800" imgH="469800" progId="Equation.DSMT4">
                   <p:embed/>
                   <p:pic>
                     <p:nvPicPr>
@@ -3782,8 +3784,272 @@
                     </p:blipFill>
                     <p:spPr bwMode="auto">
                       <a:xfrm>
-                        <a:off x="1043608" y="1916832"/>
-                        <a:ext cx="5689600" cy="2686050"/>
+                        <a:off x="539552" y="4221088"/>
+                        <a:ext cx="8020590" cy="1159504"/>
+                      </a:xfrm>
+                      <a:prstGeom prst="rect">
+                        <a:avLst/>
+                      </a:prstGeom>
+                      <a:noFill/>
+                      <a:ln>
+                        <a:noFill/>
+                      </a:ln>
+                      <a:extLst/>
+                    </p:spPr>
+                  </p:pic>
+                </p:oleObj>
+              </mc:Fallback>
+            </mc:AlternateContent>
+          </a:graphicData>
+        </a:graphic>
+      </p:graphicFrame>
+      <p:sp>
+        <p:nvSpPr>
+          <p:cNvPr id="5" name="TextBox 4"/>
+          <p:cNvSpPr txBox="1"/>
+          <p:nvPr/>
+        </p:nvSpPr>
+        <p:spPr>
+          <a:xfrm>
+            <a:off x="539552" y="1124744"/>
+            <a:ext cx="8315033" cy="369332"/>
+          </a:xfrm>
+          <a:prstGeom prst="rect">
+            <a:avLst/>
+          </a:prstGeom>
+          <a:noFill/>
+        </p:spPr>
+        <p:txBody>
+          <a:bodyPr wrap="none" rtlCol="0">
+            <a:spAutoFit/>
+          </a:bodyPr>
+          <a:lstStyle/>
+          <a:p>
+            <a:r>
+              <a:rPr lang="en-GB" dirty="0" smtClean="0"/>
+              <a:t>Velocity profile at sample at moment time t</a:t>
+            </a:r>
+            <a:r>
+              <a:rPr lang="en-GB" baseline="-25000" dirty="0" smtClean="0"/>
+              <a:t>0</a:t>
+            </a:r>
+            <a:r>
+              <a:rPr lang="en-GB" dirty="0" smtClean="0"/>
+              <a:t>: (assuming velocity transfer only at          ) </a:t>
+            </a:r>
+            <a:endParaRPr lang="en-GB" dirty="0"/>
+          </a:p>
+        </p:txBody>
+      </p:sp>
+      <p:graphicFrame>
+        <p:nvGraphicFramePr>
+          <p:cNvPr id="6" name="Object 5"/>
+          <p:cNvGraphicFramePr>
+            <a:graphicFrameLocks noChangeAspect="1"/>
+          </p:cNvGraphicFramePr>
+          <p:nvPr>
+            <p:extLst>
+              <p:ext uri="{D42A27DB-BD31-4B8C-83A1-F6EECF244321}">
+                <p14:modId xmlns:p14="http://schemas.microsoft.com/office/powerpoint/2010/main" val="1716359997"/>
+              </p:ext>
+            </p:extLst>
+          </p:nvPr>
+        </p:nvGraphicFramePr>
+        <p:xfrm>
+          <a:off x="1014413" y="1628775"/>
+          <a:ext cx="7067550" cy="530225"/>
+        </p:xfrm>
+        <a:graphic>
+          <a:graphicData uri="http://schemas.openxmlformats.org/presentationml/2006/ole">
+            <mc:AlternateContent xmlns:mc="http://schemas.openxmlformats.org/markup-compatibility/2006">
+              <mc:Choice xmlns:v="urn:schemas-microsoft-com:vml" Requires="v">
+                <p:oleObj spid="_x0000_s9257" name="Equation" r:id="rId5" imgW="3949560" imgH="253800" progId="Equation.DSMT4">
+                  <p:embed/>
+                </p:oleObj>
+              </mc:Choice>
+              <mc:Fallback>
+                <p:oleObj name="Equation" r:id="rId5" imgW="3949560" imgH="253800" progId="Equation.DSMT4">
+                  <p:embed/>
+                  <p:pic>
+                    <p:nvPicPr>
+                      <p:cNvPr id="0" name=""/>
+                      <p:cNvPicPr/>
+                      <p:nvPr/>
+                    </p:nvPicPr>
+                    <p:blipFill>
+                      <a:blip r:embed="rId6"/>
+                      <a:stretch>
+                        <a:fillRect/>
+                      </a:stretch>
+                    </p:blipFill>
+                    <p:spPr>
+                      <a:xfrm>
+                        <a:off x="1014413" y="1628775"/>
+                        <a:ext cx="7067550" cy="530225"/>
+                      </a:xfrm>
+                      <a:prstGeom prst="rect">
+                        <a:avLst/>
+                      </a:prstGeom>
+                    </p:spPr>
+                  </p:pic>
+                </p:oleObj>
+              </mc:Fallback>
+            </mc:AlternateContent>
+          </a:graphicData>
+        </a:graphic>
+      </p:graphicFrame>
+      <p:sp>
+        <p:nvSpPr>
+          <p:cNvPr id="7" name="Rectangle 6"/>
+          <p:cNvSpPr/>
+          <p:nvPr/>
+        </p:nvSpPr>
+        <p:spPr>
+          <a:xfrm>
+            <a:off x="562804" y="2204864"/>
+            <a:ext cx="5712141" cy="369332"/>
+          </a:xfrm>
+          <a:prstGeom prst="rect">
+            <a:avLst/>
+          </a:prstGeom>
+        </p:spPr>
+        <p:txBody>
+          <a:bodyPr wrap="none">
+            <a:spAutoFit/>
+          </a:bodyPr>
+          <a:lstStyle/>
+          <a:p>
+            <a:r>
+              <a:rPr lang="en-GB" dirty="0"/>
+              <a:t>assuming </a:t>
+            </a:r>
+            <a:r>
+              <a:rPr lang="en-GB" dirty="0" smtClean="0"/>
+              <a:t>probability distribution of transfer </a:t>
+            </a:r>
+            <a:r>
+              <a:rPr lang="en-GB" dirty="0" err="1" smtClean="0">
+                <a:latin typeface="Symbol" panose="05050102010706020507" pitchFamily="18" charset="2"/>
+              </a:rPr>
+              <a:t>D</a:t>
+            </a:r>
+            <a:r>
+              <a:rPr lang="en-GB" dirty="0" err="1" smtClean="0"/>
+              <a:t>v</a:t>
+            </a:r>
+            <a:r>
+              <a:rPr lang="en-GB" dirty="0" smtClean="0"/>
+              <a:t>  as             : </a:t>
+            </a:r>
+            <a:endParaRPr lang="en-GB" dirty="0"/>
+          </a:p>
+        </p:txBody>
+      </p:sp>
+      <p:graphicFrame>
+        <p:nvGraphicFramePr>
+          <p:cNvPr id="8" name="Object 7"/>
+          <p:cNvGraphicFramePr>
+            <a:graphicFrameLocks noChangeAspect="1"/>
+          </p:cNvGraphicFramePr>
+          <p:nvPr>
+            <p:extLst>
+              <p:ext uri="{D42A27DB-BD31-4B8C-83A1-F6EECF244321}">
+                <p14:modId xmlns:p14="http://schemas.microsoft.com/office/powerpoint/2010/main" val="2127312054"/>
+              </p:ext>
+            </p:extLst>
+          </p:nvPr>
+        </p:nvGraphicFramePr>
+        <p:xfrm>
+          <a:off x="5436096" y="2267580"/>
+          <a:ext cx="590424" cy="297324"/>
+        </p:xfrm>
+        <a:graphic>
+          <a:graphicData uri="http://schemas.openxmlformats.org/presentationml/2006/ole">
+            <mc:AlternateContent xmlns:mc="http://schemas.openxmlformats.org/markup-compatibility/2006">
+              <mc:Choice xmlns:v="urn:schemas-microsoft-com:vml" Requires="v">
+                <p:oleObj spid="_x0000_s9258" name="Equation" r:id="rId7" imgW="419040" imgH="203040" progId="Equation.DSMT4">
+                  <p:embed/>
+                </p:oleObj>
+              </mc:Choice>
+              <mc:Fallback>
+                <p:oleObj name="Equation" r:id="rId7" imgW="419040" imgH="203040" progId="Equation.DSMT4">
+                  <p:embed/>
+                  <p:pic>
+                    <p:nvPicPr>
+                      <p:cNvPr id="0" name=""/>
+                      <p:cNvPicPr/>
+                      <p:nvPr/>
+                    </p:nvPicPr>
+                    <p:blipFill>
+                      <a:blip r:embed="rId8"/>
+                      <a:stretch>
+                        <a:fillRect/>
+                      </a:stretch>
+                    </p:blipFill>
+                    <p:spPr>
+                      <a:xfrm>
+                        <a:off x="5436096" y="2267580"/>
+                        <a:ext cx="590424" cy="297324"/>
+                      </a:xfrm>
+                      <a:prstGeom prst="rect">
+                        <a:avLst/>
+                      </a:prstGeom>
+                    </p:spPr>
+                  </p:pic>
+                </p:oleObj>
+              </mc:Fallback>
+            </mc:AlternateContent>
+          </a:graphicData>
+        </a:graphic>
+      </p:graphicFrame>
+      <p:graphicFrame>
+        <p:nvGraphicFramePr>
+          <p:cNvPr id="9" name="Object 8"/>
+          <p:cNvGraphicFramePr>
+            <a:graphicFrameLocks noChangeAspect="1"/>
+          </p:cNvGraphicFramePr>
+          <p:nvPr>
+            <p:extLst>
+              <p:ext uri="{D42A27DB-BD31-4B8C-83A1-F6EECF244321}">
+                <p14:modId xmlns:p14="http://schemas.microsoft.com/office/powerpoint/2010/main" val="2084096577"/>
+              </p:ext>
+            </p:extLst>
+          </p:nvPr>
+        </p:nvGraphicFramePr>
+        <p:xfrm>
+          <a:off x="2342943" y="2567732"/>
+          <a:ext cx="4408488" cy="954087"/>
+        </p:xfrm>
+        <a:graphic>
+          <a:graphicData uri="http://schemas.openxmlformats.org/presentationml/2006/ole">
+            <mc:AlternateContent xmlns:mc="http://schemas.openxmlformats.org/markup-compatibility/2006">
+              <mc:Choice xmlns:v="urn:schemas-microsoft-com:vml" Requires="v">
+                <p:oleObj spid="_x0000_s9259" name="Equation" r:id="rId9" imgW="2463480" imgH="457200" progId="Equation.DSMT4">
+                  <p:embed/>
+                </p:oleObj>
+              </mc:Choice>
+              <mc:Fallback>
+                <p:oleObj name="Equation" r:id="rId9" imgW="2463480" imgH="457200" progId="Equation.DSMT4">
+                  <p:embed/>
+                  <p:pic>
+                    <p:nvPicPr>
+                      <p:cNvPr id="0" name="Object 5"/>
+                      <p:cNvPicPr>
+                        <a:picLocks noChangeAspect="1" noChangeArrowheads="1"/>
+                      </p:cNvPicPr>
+                      <p:nvPr/>
+                    </p:nvPicPr>
+                    <p:blipFill>
+                      <a:blip r:embed="rId10"/>
+                      <a:srcRect/>
+                      <a:stretch>
+                        <a:fillRect/>
+                      </a:stretch>
+                    </p:blipFill>
+                    <p:spPr bwMode="auto">
+                      <a:xfrm>
+                        <a:off x="2342943" y="2567732"/>
+                        <a:ext cx="4408488" cy="954087"/>
                       </a:xfrm>
                       <a:prstGeom prst="rect">
                         <a:avLst/>
@@ -3811,6 +4077,93 @@
                           </a14:hiddenLine>
                         </a:ext>
                       </a:extLst>
+                    </p:spPr>
+                  </p:pic>
+                </p:oleObj>
+              </mc:Fallback>
+            </mc:AlternateContent>
+          </a:graphicData>
+        </a:graphic>
+      </p:graphicFrame>
+      <p:sp>
+        <p:nvSpPr>
+          <p:cNvPr id="10" name="TextBox 9"/>
+          <p:cNvSpPr txBox="1"/>
+          <p:nvPr/>
+        </p:nvSpPr>
+        <p:spPr>
+          <a:xfrm>
+            <a:off x="251520" y="3753376"/>
+            <a:ext cx="4448077" cy="369332"/>
+          </a:xfrm>
+          <a:prstGeom prst="rect">
+            <a:avLst/>
+          </a:prstGeom>
+          <a:noFill/>
+        </p:spPr>
+        <p:txBody>
+          <a:bodyPr wrap="none" rtlCol="0">
+            <a:spAutoFit/>
+          </a:bodyPr>
+          <a:lstStyle/>
+          <a:p>
+            <a:r>
+              <a:rPr lang="en-GB" dirty="0" smtClean="0"/>
+              <a:t>Time profile of the pulse at detector position:</a:t>
+            </a:r>
+            <a:endParaRPr lang="en-GB" dirty="0"/>
+          </a:p>
+        </p:txBody>
+      </p:sp>
+      <p:graphicFrame>
+        <p:nvGraphicFramePr>
+          <p:cNvPr id="11" name="Object 10"/>
+          <p:cNvGraphicFramePr>
+            <a:graphicFrameLocks noChangeAspect="1"/>
+          </p:cNvGraphicFramePr>
+          <p:nvPr>
+            <p:extLst>
+              <p:ext uri="{D42A27DB-BD31-4B8C-83A1-F6EECF244321}">
+                <p14:modId xmlns:p14="http://schemas.microsoft.com/office/powerpoint/2010/main" val="1414148631"/>
+              </p:ext>
+            </p:extLst>
+          </p:nvPr>
+        </p:nvGraphicFramePr>
+        <p:xfrm>
+          <a:off x="8164780" y="1181512"/>
+          <a:ext cx="448816" cy="261809"/>
+        </p:xfrm>
+        <a:graphic>
+          <a:graphicData uri="http://schemas.openxmlformats.org/presentationml/2006/ole">
+            <mc:AlternateContent xmlns:mc="http://schemas.openxmlformats.org/markup-compatibility/2006">
+              <mc:Choice xmlns:v="urn:schemas-microsoft-com:vml" Requires="v">
+                <p:oleObj spid="_x0000_s9260" name="Equation" r:id="rId11" imgW="304560" imgH="177480" progId="Equation.DSMT4">
+                  <p:embed/>
+                </p:oleObj>
+              </mc:Choice>
+              <mc:Fallback>
+                <p:oleObj name="Equation" r:id="rId11" imgW="304560" imgH="177480" progId="Equation.DSMT4">
+                  <p:embed/>
+                  <p:pic>
+                    <p:nvPicPr>
+                      <p:cNvPr id="0" name=""/>
+                      <p:cNvPicPr/>
+                      <p:nvPr/>
+                    </p:nvPicPr>
+                    <p:blipFill>
+                      <a:blip r:embed="rId12"/>
+                      <a:stretch>
+                        <a:fillRect/>
+                      </a:stretch>
+                    </p:blipFill>
+                    <p:spPr>
+                      <a:xfrm>
+                        <a:off x="8164780" y="1181512"/>
+                        <a:ext cx="448816" cy="261809"/>
+                      </a:xfrm>
+                      <a:prstGeom prst="rect">
+                        <a:avLst/>
+                      </a:prstGeom>
                     </p:spPr>
                   </p:pic>
                 </p:oleObj>
@@ -3902,7 +4255,7 @@
           <a:graphicData uri="http://schemas.openxmlformats.org/presentationml/2006/ole">
             <mc:AlternateContent xmlns:mc="http://schemas.openxmlformats.org/markup-compatibility/2006">
               <mc:Choice xmlns:v="urn:schemas-microsoft-com:vml" Requires="v">
-                <p:oleObj spid="_x0000_s7211" name="Equation" r:id="rId3" imgW="2565360" imgH="469800" progId="Equation.DSMT4">
+                <p:oleObj spid="_x0000_s7218" name="Equation" r:id="rId3" imgW="2565360" imgH="469800" progId="Equation.DSMT4">
                   <p:embed/>
                 </p:oleObj>
               </mc:Choice>
@@ -4564,7 +4917,7 @@
           <a:graphicData uri="http://schemas.openxmlformats.org/presentationml/2006/ole">
             <mc:AlternateContent xmlns:mc="http://schemas.openxmlformats.org/markup-compatibility/2006">
               <mc:Choice xmlns:v="urn:schemas-microsoft-com:vml" Requires="v">
-                <p:oleObj spid="_x0000_s2576" name="Equation" r:id="rId6" imgW="342720" imgH="203040" progId="Equation.DSMT4">
+                <p:oleObj spid="_x0000_s2639" name="Equation" r:id="rId6" imgW="342720" imgH="203040" progId="Equation.DSMT4">
                   <p:embed/>
                 </p:oleObj>
               </mc:Choice>
@@ -4621,7 +4974,7 @@
           <a:graphicData uri="http://schemas.openxmlformats.org/presentationml/2006/ole">
             <mc:AlternateContent xmlns:mc="http://schemas.openxmlformats.org/markup-compatibility/2006">
               <mc:Choice xmlns:v="urn:schemas-microsoft-com:vml" Requires="v">
-                <p:oleObj spid="_x0000_s2577" name="Equation" r:id="rId8" imgW="330120" imgH="203040" progId="Equation.DSMT4">
+                <p:oleObj spid="_x0000_s2640" name="Equation" r:id="rId8" imgW="330120" imgH="203040" progId="Equation.DSMT4">
                   <p:embed/>
                 </p:oleObj>
               </mc:Choice>
@@ -4692,7 +5045,7 @@
             <a:graphicData uri="http://schemas.openxmlformats.org/presentationml/2006/ole">
               <mc:AlternateContent xmlns:mc="http://schemas.openxmlformats.org/markup-compatibility/2006">
                 <mc:Choice xmlns:v="urn:schemas-microsoft-com:vml" Requires="v">
-                  <p:oleObj spid="_x0000_s2578" name="Equation" r:id="rId10" imgW="4140000" imgH="457200" progId="Equation.DSMT4">
+                  <p:oleObj spid="_x0000_s2641" name="Equation" r:id="rId10" imgW="4140000" imgH="457200" progId="Equation.DSMT4">
                     <p:embed/>
                   </p:oleObj>
                 </mc:Choice>
@@ -4850,7 +5203,7 @@
           <a:graphicData uri="http://schemas.openxmlformats.org/presentationml/2006/ole">
             <mc:AlternateContent xmlns:mc="http://schemas.openxmlformats.org/markup-compatibility/2006">
               <mc:Choice xmlns:v="urn:schemas-microsoft-com:vml" Requires="v">
-                <p:oleObj spid="_x0000_s2579" name="Equation" r:id="rId13" imgW="355320" imgH="253800" progId="Equation.DSMT4">
+                <p:oleObj spid="_x0000_s2642" name="Equation" r:id="rId13" imgW="355320" imgH="253800" progId="Equation.DSMT4">
                   <p:embed/>
                 </p:oleObj>
               </mc:Choice>
@@ -4907,7 +5260,7 @@
           <a:graphicData uri="http://schemas.openxmlformats.org/presentationml/2006/ole">
             <mc:AlternateContent xmlns:mc="http://schemas.openxmlformats.org/markup-compatibility/2006">
               <mc:Choice xmlns:v="urn:schemas-microsoft-com:vml" Requires="v">
-                <p:oleObj spid="_x0000_s2580" name="Equation" r:id="rId15" imgW="380880" imgH="253800" progId="Equation.DSMT4">
+                <p:oleObj spid="_x0000_s2643" name="Equation" r:id="rId15" imgW="380880" imgH="253800" progId="Equation.DSMT4">
                   <p:embed/>
                 </p:oleObj>
               </mc:Choice>
@@ -4964,7 +5317,7 @@
           <a:graphicData uri="http://schemas.openxmlformats.org/presentationml/2006/ole">
             <mc:AlternateContent xmlns:mc="http://schemas.openxmlformats.org/markup-compatibility/2006">
               <mc:Choice xmlns:v="urn:schemas-microsoft-com:vml" Requires="v">
-                <p:oleObj spid="_x0000_s2581" name="Equation" r:id="rId17" imgW="368280" imgH="253800" progId="Equation.DSMT4">
+                <p:oleObj spid="_x0000_s2644" name="Equation" r:id="rId17" imgW="368280" imgH="253800" progId="Equation.DSMT4">
                   <p:embed/>
                 </p:oleObj>
               </mc:Choice>
@@ -5021,7 +5374,7 @@
           <a:graphicData uri="http://schemas.openxmlformats.org/presentationml/2006/ole">
             <mc:AlternateContent xmlns:mc="http://schemas.openxmlformats.org/markup-compatibility/2006">
               <mc:Choice xmlns:v="urn:schemas-microsoft-com:vml" Requires="v">
-                <p:oleObj spid="_x0000_s2582" name="Equation" r:id="rId19" imgW="317160" imgH="203040" progId="Equation.DSMT4">
+                <p:oleObj spid="_x0000_s2645" name="Equation" r:id="rId19" imgW="317160" imgH="203040" progId="Equation.DSMT4">
                   <p:embed/>
                 </p:oleObj>
               </mc:Choice>
@@ -5078,7 +5431,7 @@
           <a:graphicData uri="http://schemas.openxmlformats.org/presentationml/2006/ole">
             <mc:AlternateContent xmlns:mc="http://schemas.openxmlformats.org/markup-compatibility/2006">
               <mc:Choice xmlns:v="urn:schemas-microsoft-com:vml" Requires="v">
-                <p:oleObj spid="_x0000_s2583" name="Equation" r:id="rId21" imgW="304560" imgH="203040" progId="Equation.DSMT4">
+                <p:oleObj spid="_x0000_s2646" name="Equation" r:id="rId21" imgW="304560" imgH="203040" progId="Equation.DSMT4">
                   <p:embed/>
                 </p:oleObj>
               </mc:Choice>
@@ -5579,7 +5932,7 @@
           <a:graphicData uri="http://schemas.openxmlformats.org/presentationml/2006/ole">
             <mc:AlternateContent xmlns:mc="http://schemas.openxmlformats.org/markup-compatibility/2006">
               <mc:Choice xmlns:v="urn:schemas-microsoft-com:vml" Requires="v">
-                <p:oleObj spid="_x0000_s2584" name="Equation" r:id="rId23" imgW="330120" imgH="203040" progId="Equation.DSMT4">
+                <p:oleObj spid="_x0000_s2647" name="Equation" r:id="rId23" imgW="330120" imgH="203040" progId="Equation.DSMT4">
                   <p:embed/>
                 </p:oleObj>
               </mc:Choice>
@@ -6131,7 +6484,7 @@
           <a:graphicData uri="http://schemas.openxmlformats.org/presentationml/2006/ole">
             <mc:AlternateContent xmlns:mc="http://schemas.openxmlformats.org/markup-compatibility/2006">
               <mc:Choice xmlns:v="urn:schemas-microsoft-com:vml" Requires="v">
-                <p:oleObj spid="_x0000_s4143" name="Equation" r:id="rId5" imgW="2222280" imgH="469800" progId="Equation.DSMT4">
+                <p:oleObj spid="_x0000_s4150" name="Equation" r:id="rId5" imgW="2222280" imgH="469800" progId="Equation.DSMT4">
                   <p:embed/>
                 </p:oleObj>
               </mc:Choice>
@@ -6609,7 +6962,7 @@
           <a:graphicData uri="http://schemas.openxmlformats.org/presentationml/2006/ole">
             <mc:AlternateContent xmlns:mc="http://schemas.openxmlformats.org/markup-compatibility/2006">
               <mc:Choice xmlns:v="urn:schemas-microsoft-com:vml" Requires="v">
-                <p:oleObj spid="_x0000_s5442" name="Equation" r:id="rId7" imgW="3682800" imgH="457200" progId="Equation.DSMT4">
+                <p:oleObj spid="_x0000_s5498" name="Equation" r:id="rId7" imgW="3682800" imgH="457200" progId="Equation.DSMT4">
                   <p:embed/>
                 </p:oleObj>
               </mc:Choice>
@@ -6666,7 +7019,7 @@
           <a:graphicData uri="http://schemas.openxmlformats.org/presentationml/2006/ole">
             <mc:AlternateContent xmlns:mc="http://schemas.openxmlformats.org/markup-compatibility/2006">
               <mc:Choice xmlns:v="urn:schemas-microsoft-com:vml" Requires="v">
-                <p:oleObj spid="_x0000_s5443" name="Equation" r:id="rId9" imgW="342720" imgH="203040" progId="Equation.DSMT4">
+                <p:oleObj spid="_x0000_s5499" name="Equation" r:id="rId9" imgW="342720" imgH="203040" progId="Equation.DSMT4">
                   <p:embed/>
                 </p:oleObj>
               </mc:Choice>
@@ -6749,7 +7102,7 @@
           <a:graphicData uri="http://schemas.openxmlformats.org/presentationml/2006/ole">
             <mc:AlternateContent xmlns:mc="http://schemas.openxmlformats.org/markup-compatibility/2006">
               <mc:Choice xmlns:v="urn:schemas-microsoft-com:vml" Requires="v">
-                <p:oleObj spid="_x0000_s5444" name="Equation" r:id="rId11" imgW="330120" imgH="203040" progId="Equation.DSMT4">
+                <p:oleObj spid="_x0000_s5500" name="Equation" r:id="rId11" imgW="330120" imgH="203040" progId="Equation.DSMT4">
                   <p:embed/>
                 </p:oleObj>
               </mc:Choice>
@@ -6838,7 +7191,7 @@
           <a:graphicData uri="http://schemas.openxmlformats.org/presentationml/2006/ole">
             <mc:AlternateContent xmlns:mc="http://schemas.openxmlformats.org/markup-compatibility/2006">
               <mc:Choice xmlns:v="urn:schemas-microsoft-com:vml" Requires="v">
-                <p:oleObj spid="_x0000_s5445" name="Equation" r:id="rId13" imgW="330120" imgH="203040" progId="Equation.DSMT4">
+                <p:oleObj spid="_x0000_s5501" name="Equation" r:id="rId13" imgW="330120" imgH="203040" progId="Equation.DSMT4">
                   <p:embed/>
                 </p:oleObj>
               </mc:Choice>
@@ -6927,7 +7280,7 @@
           <a:graphicData uri="http://schemas.openxmlformats.org/presentationml/2006/ole">
             <mc:AlternateContent xmlns:mc="http://schemas.openxmlformats.org/markup-compatibility/2006">
               <mc:Choice xmlns:v="urn:schemas-microsoft-com:vml" Requires="v">
-                <p:oleObj spid="_x0000_s5446" name="Equation" r:id="rId15" imgW="380880" imgH="253800" progId="Equation.DSMT4">
+                <p:oleObj spid="_x0000_s5502" name="Equation" r:id="rId15" imgW="380880" imgH="253800" progId="Equation.DSMT4">
                   <p:embed/>
                 </p:oleObj>
               </mc:Choice>
@@ -6997,7 +7350,7 @@
           <a:graphicData uri="http://schemas.openxmlformats.org/presentationml/2006/ole">
             <mc:AlternateContent xmlns:mc="http://schemas.openxmlformats.org/markup-compatibility/2006">
               <mc:Choice xmlns:v="urn:schemas-microsoft-com:vml" Requires="v">
-                <p:oleObj spid="_x0000_s5447" name="Equation" r:id="rId17" imgW="368280" imgH="253800" progId="Equation.DSMT4">
+                <p:oleObj spid="_x0000_s5503" name="Equation" r:id="rId17" imgW="368280" imgH="253800" progId="Equation.DSMT4">
                   <p:embed/>
                 </p:oleObj>
               </mc:Choice>
@@ -7086,7 +7439,7 @@
           <a:graphicData uri="http://schemas.openxmlformats.org/presentationml/2006/ole">
             <mc:AlternateContent xmlns:mc="http://schemas.openxmlformats.org/markup-compatibility/2006">
               <mc:Choice xmlns:v="urn:schemas-microsoft-com:vml" Requires="v">
-                <p:oleObj spid="_x0000_s5448" name="Equation" r:id="rId19" imgW="355320" imgH="253800" progId="Equation.DSMT4">
+                <p:oleObj spid="_x0000_s5504" name="Equation" r:id="rId19" imgW="355320" imgH="253800" progId="Equation.DSMT4">
                   <p:embed/>
                 </p:oleObj>
               </mc:Choice>
@@ -7378,7 +7731,7 @@
           <a:graphicData uri="http://schemas.openxmlformats.org/presentationml/2006/ole">
             <mc:AlternateContent xmlns:mc="http://schemas.openxmlformats.org/markup-compatibility/2006">
               <mc:Choice xmlns:v="urn:schemas-microsoft-com:vml" Requires="v">
-                <p:oleObj spid="_x0000_s5449" name="Equation" r:id="rId21" imgW="330120" imgH="203040" progId="Equation.DSMT4">
+                <p:oleObj spid="_x0000_s5505" name="Equation" r:id="rId21" imgW="330120" imgH="203040" progId="Equation.DSMT4">
                   <p:embed/>
                 </p:oleObj>
               </mc:Choice>
@@ -7546,7 +7899,7 @@
           <a:graphicData uri="http://schemas.openxmlformats.org/presentationml/2006/ole">
             <mc:AlternateContent xmlns:mc="http://schemas.openxmlformats.org/markup-compatibility/2006">
               <mc:Choice xmlns:v="urn:schemas-microsoft-com:vml" Requires="v">
-                <p:oleObj spid="_x0000_s6441" name="Equation" r:id="rId3" imgW="1765080" imgH="469800" progId="Equation.DSMT4">
+                <p:oleObj spid="_x0000_s6497" name="Equation" r:id="rId3" imgW="1765080" imgH="469800" progId="Equation.DSMT4">
                   <p:embed/>
                 </p:oleObj>
               </mc:Choice>
@@ -7826,7 +8179,7 @@
           <a:graphicData uri="http://schemas.openxmlformats.org/presentationml/2006/ole">
             <mc:AlternateContent xmlns:mc="http://schemas.openxmlformats.org/markup-compatibility/2006">
               <mc:Choice xmlns:v="urn:schemas-microsoft-com:vml" Requires="v">
-                <p:oleObj spid="_x0000_s6442" name="Equation" r:id="rId9" imgW="330120" imgH="203040" progId="Equation.DSMT4">
+                <p:oleObj spid="_x0000_s6498" name="Equation" r:id="rId9" imgW="330120" imgH="203040" progId="Equation.DSMT4">
                   <p:embed/>
                 </p:oleObj>
               </mc:Choice>
@@ -7909,7 +8262,7 @@
           <a:graphicData uri="http://schemas.openxmlformats.org/presentationml/2006/ole">
             <mc:AlternateContent xmlns:mc="http://schemas.openxmlformats.org/markup-compatibility/2006">
               <mc:Choice xmlns:v="urn:schemas-microsoft-com:vml" Requires="v">
-                <p:oleObj spid="_x0000_s6443" name="Equation" r:id="rId11" imgW="330057" imgH="203112" progId="Equation.DSMT4">
+                <p:oleObj spid="_x0000_s6499" name="Equation" r:id="rId11" imgW="330057" imgH="203112" progId="Equation.DSMT4">
                   <p:embed/>
                 </p:oleObj>
               </mc:Choice>
@@ -7998,7 +8351,7 @@
           <a:graphicData uri="http://schemas.openxmlformats.org/presentationml/2006/ole">
             <mc:AlternateContent xmlns:mc="http://schemas.openxmlformats.org/markup-compatibility/2006">
               <mc:Choice xmlns:v="urn:schemas-microsoft-com:vml" Requires="v">
-                <p:oleObj spid="_x0000_s6444" name="Equation" r:id="rId13" imgW="241200" imgH="203040" progId="Equation.DSMT4">
+                <p:oleObj spid="_x0000_s6500" name="Equation" r:id="rId13" imgW="241200" imgH="203040" progId="Equation.DSMT4">
                   <p:embed/>
                 </p:oleObj>
               </mc:Choice>
@@ -8081,7 +8434,7 @@
           <a:graphicData uri="http://schemas.openxmlformats.org/presentationml/2006/ole">
             <mc:AlternateContent xmlns:mc="http://schemas.openxmlformats.org/markup-compatibility/2006">
               <mc:Choice xmlns:v="urn:schemas-microsoft-com:vml" Requires="v">
-                <p:oleObj spid="_x0000_s6445" name="Equation" r:id="rId15" imgW="368140" imgH="253890" progId="Equation.DSMT4">
+                <p:oleObj spid="_x0000_s6501" name="Equation" r:id="rId15" imgW="368140" imgH="253890" progId="Equation.DSMT4">
                   <p:embed/>
                 </p:oleObj>
               </mc:Choice>
@@ -8170,7 +8523,7 @@
           <a:graphicData uri="http://schemas.openxmlformats.org/presentationml/2006/ole">
             <mc:AlternateContent xmlns:mc="http://schemas.openxmlformats.org/markup-compatibility/2006">
               <mc:Choice xmlns:v="urn:schemas-microsoft-com:vml" Requires="v">
-                <p:oleObj spid="_x0000_s6446" name="Equation" r:id="rId17" imgW="380835" imgH="253890" progId="Equation.DSMT4">
+                <p:oleObj spid="_x0000_s6502" name="Equation" r:id="rId17" imgW="380835" imgH="253890" progId="Equation.DSMT4">
                   <p:embed/>
                 </p:oleObj>
               </mc:Choice>
@@ -8327,7 +8680,7 @@
           <a:graphicData uri="http://schemas.openxmlformats.org/presentationml/2006/ole">
             <mc:AlternateContent xmlns:mc="http://schemas.openxmlformats.org/markup-compatibility/2006">
               <mc:Choice xmlns:v="urn:schemas-microsoft-com:vml" Requires="v">
-                <p:oleObj spid="_x0000_s6447" name="Equation" r:id="rId19" imgW="241200" imgH="203040" progId="Equation.DSMT4">
+                <p:oleObj spid="_x0000_s6503" name="Equation" r:id="rId19" imgW="241200" imgH="203040" progId="Equation.DSMT4">
                   <p:embed/>
                 </p:oleObj>
               </mc:Choice>
@@ -8410,7 +8763,7 @@
           <a:graphicData uri="http://schemas.openxmlformats.org/presentationml/2006/ole">
             <mc:AlternateContent xmlns:mc="http://schemas.openxmlformats.org/markup-compatibility/2006">
               <mc:Choice xmlns:v="urn:schemas-microsoft-com:vml" Requires="v">
-                <p:oleObj spid="_x0000_s6448" name="Equation" r:id="rId20" imgW="330057" imgH="203112" progId="Equation.DSMT4">
+                <p:oleObj spid="_x0000_s6504" name="Equation" r:id="rId20" imgW="330057" imgH="203112" progId="Equation.DSMT4">
                   <p:embed/>
                 </p:oleObj>
               </mc:Choice>

</xml_diff>